<commit_message>
update course materials and papers
</commit_message>
<xml_diff>
--- a/_umkc-teaching/slides/Lecture3.pptx
+++ b/_umkc-teaching/slides/Lecture3.pptx
@@ -5,7 +5,7 @@
     <p:sldMasterId id="2147483648" r:id="rId1"/>
   </p:sldMasterIdLst>
   <p:notesMasterIdLst>
-    <p:notesMasterId r:id="rId26"/>
+    <p:notesMasterId r:id="rId27"/>
   </p:notesMasterIdLst>
   <p:sldIdLst>
     <p:sldId id="257" r:id="rId2"/>
@@ -31,7 +31,8 @@
     <p:sldId id="331" r:id="rId22"/>
     <p:sldId id="332" r:id="rId23"/>
     <p:sldId id="333" r:id="rId24"/>
-    <p:sldId id="293" r:id="rId25"/>
+    <p:sldId id="334" r:id="rId25"/>
+    <p:sldId id="293" r:id="rId26"/>
   </p:sldIdLst>
   <p:sldSz cx="12192000" cy="6858000"/>
   <p:notesSz cx="6858000" cy="9144000"/>
@@ -220,7 +221,7 @@
           <a:p>
             <a:fld id="{7AF9442D-9D7C-40D7-A5A3-649EA8C158D2}" type="datetimeFigureOut">
               <a:rPr lang="en-US" smtClean="0"/>
-              <a:t>9/12/23</a:t>
+              <a:t>9/20/23</a:t>
             </a:fld>
             <a:endParaRPr lang="en-US"/>
           </a:p>
@@ -1663,6 +1664,90 @@
 </p:notes>
 </file>
 
+<file path=ppt/notesSlides/notesSlide22.xml><?xml version="1.0" encoding="utf-8"?>
+<p:notes xmlns:a="http://schemas.openxmlformats.org/drawingml/2006/main" xmlns:r="http://schemas.openxmlformats.org/officeDocument/2006/relationships" xmlns:p="http://schemas.openxmlformats.org/presentationml/2006/main">
+  <p:cSld>
+    <p:spTree>
+      <p:nvGrpSpPr>
+        <p:cNvPr id="1" name=""/>
+        <p:cNvGrpSpPr/>
+        <p:nvPr/>
+      </p:nvGrpSpPr>
+      <p:grpSpPr>
+        <a:xfrm>
+          <a:off x="0" y="0"/>
+          <a:ext cx="0" cy="0"/>
+          <a:chOff x="0" y="0"/>
+          <a:chExt cx="0" cy="0"/>
+        </a:xfrm>
+      </p:grpSpPr>
+      <p:sp>
+        <p:nvSpPr>
+          <p:cNvPr id="2" name="Slide Image Placeholder 1"/>
+          <p:cNvSpPr>
+            <a:spLocks noGrp="1" noRot="1" noChangeAspect="1"/>
+          </p:cNvSpPr>
+          <p:nvPr>
+            <p:ph type="sldImg"/>
+          </p:nvPr>
+        </p:nvSpPr>
+        <p:spPr/>
+      </p:sp>
+      <p:sp>
+        <p:nvSpPr>
+          <p:cNvPr id="3" name="Notes Placeholder 2"/>
+          <p:cNvSpPr>
+            <a:spLocks noGrp="1"/>
+          </p:cNvSpPr>
+          <p:nvPr>
+            <p:ph type="body" idx="1"/>
+          </p:nvPr>
+        </p:nvSpPr>
+        <p:spPr/>
+        <p:txBody>
+          <a:bodyPr/>
+          <a:lstStyle/>
+          <a:p>
+            <a:endParaRPr lang="en-US" dirty="0"/>
+          </a:p>
+        </p:txBody>
+      </p:sp>
+      <p:sp>
+        <p:nvSpPr>
+          <p:cNvPr id="4" name="Slide Number Placeholder 3"/>
+          <p:cNvSpPr>
+            <a:spLocks noGrp="1"/>
+          </p:cNvSpPr>
+          <p:nvPr>
+            <p:ph type="sldNum" sz="quarter" idx="5"/>
+          </p:nvPr>
+        </p:nvSpPr>
+        <p:spPr/>
+        <p:txBody>
+          <a:bodyPr/>
+          <a:lstStyle/>
+          <a:p>
+            <a:fld id="{3F8BDF20-BE86-4883-8A23-4CE3D0058BEA}" type="slidenum">
+              <a:rPr lang="en-US" smtClean="0"/>
+              <a:t>24</a:t>
+            </a:fld>
+            <a:endParaRPr lang="en-US"/>
+          </a:p>
+        </p:txBody>
+      </p:sp>
+    </p:spTree>
+    <p:extLst>
+      <p:ext uri="{BB962C8B-B14F-4D97-AF65-F5344CB8AC3E}">
+        <p14:creationId xmlns:p14="http://schemas.microsoft.com/office/powerpoint/2010/main" val="3644619105"/>
+      </p:ext>
+    </p:extLst>
+  </p:cSld>
+  <p:clrMapOvr>
+    <a:masterClrMapping/>
+  </p:clrMapOvr>
+</p:notes>
+</file>
+
 <file path=ppt/notesSlides/notesSlide3.xml><?xml version="1.0" encoding="utf-8"?>
 <p:notes xmlns:a="http://schemas.openxmlformats.org/drawingml/2006/main" xmlns:r="http://schemas.openxmlformats.org/officeDocument/2006/relationships" xmlns:p="http://schemas.openxmlformats.org/presentationml/2006/main">
   <p:cSld>
@@ -2380,7 +2465,7 @@
           <a:p>
             <a:fld id="{41748473-9145-41F0-ADB9-654A949CD218}" type="datetimeFigureOut">
               <a:rPr lang="en-US" smtClean="0"/>
-              <a:t>9/12/23</a:t>
+              <a:t>9/20/23</a:t>
             </a:fld>
             <a:endParaRPr lang="en-US"/>
           </a:p>
@@ -2548,7 +2633,7 @@
           <a:p>
             <a:fld id="{41748473-9145-41F0-ADB9-654A949CD218}" type="datetimeFigureOut">
               <a:rPr lang="en-US" smtClean="0"/>
-              <a:t>9/12/23</a:t>
+              <a:t>9/20/23</a:t>
             </a:fld>
             <a:endParaRPr lang="en-US"/>
           </a:p>
@@ -2726,7 +2811,7 @@
           <a:p>
             <a:fld id="{41748473-9145-41F0-ADB9-654A949CD218}" type="datetimeFigureOut">
               <a:rPr lang="en-US" smtClean="0"/>
-              <a:t>9/12/23</a:t>
+              <a:t>9/20/23</a:t>
             </a:fld>
             <a:endParaRPr lang="en-US"/>
           </a:p>
@@ -2894,7 +2979,7 @@
           <a:p>
             <a:fld id="{41748473-9145-41F0-ADB9-654A949CD218}" type="datetimeFigureOut">
               <a:rPr lang="en-US" smtClean="0"/>
-              <a:t>9/12/23</a:t>
+              <a:t>9/20/23</a:t>
             </a:fld>
             <a:endParaRPr lang="en-US"/>
           </a:p>
@@ -3139,7 +3224,7 @@
           <a:p>
             <a:fld id="{41748473-9145-41F0-ADB9-654A949CD218}" type="datetimeFigureOut">
               <a:rPr lang="en-US" smtClean="0"/>
-              <a:t>9/12/23</a:t>
+              <a:t>9/20/23</a:t>
             </a:fld>
             <a:endParaRPr lang="en-US"/>
           </a:p>
@@ -3368,7 +3453,7 @@
           <a:p>
             <a:fld id="{41748473-9145-41F0-ADB9-654A949CD218}" type="datetimeFigureOut">
               <a:rPr lang="en-US" smtClean="0"/>
-              <a:t>9/12/23</a:t>
+              <a:t>9/20/23</a:t>
             </a:fld>
             <a:endParaRPr lang="en-US"/>
           </a:p>
@@ -3732,7 +3817,7 @@
           <a:p>
             <a:fld id="{41748473-9145-41F0-ADB9-654A949CD218}" type="datetimeFigureOut">
               <a:rPr lang="en-US" smtClean="0"/>
-              <a:t>9/12/23</a:t>
+              <a:t>9/20/23</a:t>
             </a:fld>
             <a:endParaRPr lang="en-US"/>
           </a:p>
@@ -3849,7 +3934,7 @@
           <a:p>
             <a:fld id="{41748473-9145-41F0-ADB9-654A949CD218}" type="datetimeFigureOut">
               <a:rPr lang="en-US" smtClean="0"/>
-              <a:t>9/12/23</a:t>
+              <a:t>9/20/23</a:t>
             </a:fld>
             <a:endParaRPr lang="en-US"/>
           </a:p>
@@ -3944,7 +4029,7 @@
           <a:p>
             <a:fld id="{41748473-9145-41F0-ADB9-654A949CD218}" type="datetimeFigureOut">
               <a:rPr lang="en-US" smtClean="0"/>
-              <a:t>9/12/23</a:t>
+              <a:t>9/20/23</a:t>
             </a:fld>
             <a:endParaRPr lang="en-US"/>
           </a:p>
@@ -4219,7 +4304,7 @@
           <a:p>
             <a:fld id="{41748473-9145-41F0-ADB9-654A949CD218}" type="datetimeFigureOut">
               <a:rPr lang="en-US" smtClean="0"/>
-              <a:t>9/12/23</a:t>
+              <a:t>9/20/23</a:t>
             </a:fld>
             <a:endParaRPr lang="en-US"/>
           </a:p>
@@ -4471,7 +4556,7 @@
           <a:p>
             <a:fld id="{41748473-9145-41F0-ADB9-654A949CD218}" type="datetimeFigureOut">
               <a:rPr lang="en-US" smtClean="0"/>
-              <a:t>9/12/23</a:t>
+              <a:t>9/20/23</a:t>
             </a:fld>
             <a:endParaRPr lang="en-US"/>
           </a:p>
@@ -4682,7 +4767,7 @@
           <a:p>
             <a:fld id="{41748473-9145-41F0-ADB9-654A949CD218}" type="datetimeFigureOut">
               <a:rPr lang="en-US" smtClean="0"/>
-              <a:t>9/12/23</a:t>
+              <a:t>9/20/23</a:t>
             </a:fld>
             <a:endParaRPr lang="en-US"/>
           </a:p>
@@ -16518,6 +16603,112 @@
       </p:grpSpPr>
       <p:sp>
         <p:nvSpPr>
+          <p:cNvPr id="2" name="Title 1"/>
+          <p:cNvSpPr>
+            <a:spLocks noGrp="1"/>
+          </p:cNvSpPr>
+          <p:nvPr>
+            <p:ph type="title"/>
+          </p:nvPr>
+        </p:nvSpPr>
+        <p:spPr>
+          <a:xfrm>
+            <a:off x="838200" y="365126"/>
+            <a:ext cx="10515600" cy="981894"/>
+          </a:xfrm>
+        </p:spPr>
+        <p:txBody>
+          <a:bodyPr>
+            <a:normAutofit/>
+          </a:bodyPr>
+          <a:lstStyle/>
+          <a:p>
+            <a:r>
+              <a:rPr lang="en-US" dirty="0"/>
+              <a:t>Adjusted R-Squared </a:t>
+            </a:r>
+          </a:p>
+        </p:txBody>
+      </p:sp>
+      <p:pic>
+        <p:nvPicPr>
+          <p:cNvPr id="1026" name="Picture 2">
+            <a:extLst>
+              <a:ext uri="{FF2B5EF4-FFF2-40B4-BE49-F238E27FC236}">
+                <a16:creationId xmlns:a16="http://schemas.microsoft.com/office/drawing/2014/main" id="{94595D1A-F7FB-4201-087D-4EAD932C50AA}"/>
+              </a:ext>
+            </a:extLst>
+          </p:cNvPr>
+          <p:cNvPicPr>
+            <a:picLocks noChangeAspect="1" noChangeArrowheads="1"/>
+          </p:cNvPicPr>
+          <p:nvPr/>
+        </p:nvPicPr>
+        <p:blipFill>
+          <a:blip r:embed="rId3">
+            <a:extLst>
+              <a:ext uri="{28A0092B-C50C-407E-A947-70E740481C1C}">
+                <a14:useLocalDpi xmlns:a14="http://schemas.microsoft.com/office/drawing/2010/main" val="0"/>
+              </a:ext>
+            </a:extLst>
+          </a:blip>
+          <a:srcRect/>
+          <a:stretch>
+            <a:fillRect/>
+          </a:stretch>
+        </p:blipFill>
+        <p:spPr bwMode="auto">
+          <a:xfrm>
+            <a:off x="1714176" y="2058637"/>
+            <a:ext cx="7569309" cy="2898441"/>
+          </a:xfrm>
+          <a:prstGeom prst="rect">
+            <a:avLst/>
+          </a:prstGeom>
+          <a:noFill/>
+          <a:extLst>
+            <a:ext uri="{909E8E84-426E-40DD-AFC4-6F175D3DCCD1}">
+              <a14:hiddenFill xmlns:a14="http://schemas.microsoft.com/office/drawing/2010/main">
+                <a:solidFill>
+                  <a:srgbClr val="FFFFFF"/>
+                </a:solidFill>
+              </a14:hiddenFill>
+            </a:ext>
+          </a:extLst>
+        </p:spPr>
+      </p:pic>
+    </p:spTree>
+    <p:extLst>
+      <p:ext uri="{BB962C8B-B14F-4D97-AF65-F5344CB8AC3E}">
+        <p14:creationId xmlns:p14="http://schemas.microsoft.com/office/powerpoint/2010/main" val="3158653100"/>
+      </p:ext>
+    </p:extLst>
+  </p:cSld>
+  <p:clrMapOvr>
+    <a:masterClrMapping/>
+  </p:clrMapOvr>
+</p:sld>
+</file>
+
+<file path=ppt/slides/slide25.xml><?xml version="1.0" encoding="utf-8"?>
+<p:sld xmlns:a="http://schemas.openxmlformats.org/drawingml/2006/main" xmlns:r="http://schemas.openxmlformats.org/officeDocument/2006/relationships" xmlns:p="http://schemas.openxmlformats.org/presentationml/2006/main">
+  <p:cSld>
+    <p:spTree>
+      <p:nvGrpSpPr>
+        <p:cNvPr id="1" name=""/>
+        <p:cNvGrpSpPr/>
+        <p:nvPr/>
+      </p:nvGrpSpPr>
+      <p:grpSpPr>
+        <a:xfrm>
+          <a:off x="0" y="0"/>
+          <a:ext cx="0" cy="0"/>
+          <a:chOff x="0" y="0"/>
+          <a:chExt cx="0" cy="0"/>
+        </a:xfrm>
+      </p:grpSpPr>
+      <p:sp>
+        <p:nvSpPr>
           <p:cNvPr id="10" name="TextBox 9">
             <a:extLst>
               <a:ext uri="{FF2B5EF4-FFF2-40B4-BE49-F238E27FC236}">

</xml_diff>